<commit_message>
1.complete documentation of model domain design 2.add dependancy for cucumber.
</commit_message>
<xml_diff>
--- a/design.pptx
+++ b/design.pptx
@@ -6,6 +6,7 @@
   </p:sldMasterIdLst>
   <p:sldIdLst>
     <p:sldId id="256" r:id="rId2"/>
+    <p:sldId id="257" r:id="rId3"/>
   </p:sldIdLst>
   <p:sldSz cx="12192000" cy="6858000"/>
   <p:notesSz cx="6858000" cy="9144000"/>
@@ -104,6 +105,11 @@
       </a:defRPr>
     </a:lvl9pPr>
   </p:defaultTextStyle>
+  <p:extLst>
+    <p:ext uri="{EFAFB233-063F-42B5-8137-9DF3F51BA10A}">
+      <p15:sldGuideLst xmlns:p15="http://schemas.microsoft.com/office/powerpoint/2012/main"/>
+    </p:ext>
+  </p:extLst>
 </p:presentation>
 </file>
 
@@ -238,7 +244,7 @@
           <a:p>
             <a:fld id="{A3D7FE9D-6FC6-45E5-9AF4-B54471DD8207}" type="datetimeFigureOut">
               <a:rPr lang="fr-FR" smtClean="0"/>
-              <a:t>20/11/2021</a:t>
+              <a:t>20/03/2022</a:t>
             </a:fld>
             <a:endParaRPr lang="fr-FR"/>
           </a:p>
@@ -408,7 +414,7 @@
           <a:p>
             <a:fld id="{A3D7FE9D-6FC6-45E5-9AF4-B54471DD8207}" type="datetimeFigureOut">
               <a:rPr lang="fr-FR" smtClean="0"/>
-              <a:t>20/11/2021</a:t>
+              <a:t>20/03/2022</a:t>
             </a:fld>
             <a:endParaRPr lang="fr-FR"/>
           </a:p>
@@ -588,7 +594,7 @@
           <a:p>
             <a:fld id="{A3D7FE9D-6FC6-45E5-9AF4-B54471DD8207}" type="datetimeFigureOut">
               <a:rPr lang="fr-FR" smtClean="0"/>
-              <a:t>20/11/2021</a:t>
+              <a:t>20/03/2022</a:t>
             </a:fld>
             <a:endParaRPr lang="fr-FR"/>
           </a:p>
@@ -758,7 +764,7 @@
           <a:p>
             <a:fld id="{A3D7FE9D-6FC6-45E5-9AF4-B54471DD8207}" type="datetimeFigureOut">
               <a:rPr lang="fr-FR" smtClean="0"/>
-              <a:t>20/11/2021</a:t>
+              <a:t>20/03/2022</a:t>
             </a:fld>
             <a:endParaRPr lang="fr-FR"/>
           </a:p>
@@ -1004,7 +1010,7 @@
           <a:p>
             <a:fld id="{A3D7FE9D-6FC6-45E5-9AF4-B54471DD8207}" type="datetimeFigureOut">
               <a:rPr lang="fr-FR" smtClean="0"/>
-              <a:t>20/11/2021</a:t>
+              <a:t>20/03/2022</a:t>
             </a:fld>
             <a:endParaRPr lang="fr-FR"/>
           </a:p>
@@ -1236,7 +1242,7 @@
           <a:p>
             <a:fld id="{A3D7FE9D-6FC6-45E5-9AF4-B54471DD8207}" type="datetimeFigureOut">
               <a:rPr lang="fr-FR" smtClean="0"/>
-              <a:t>20/11/2021</a:t>
+              <a:t>20/03/2022</a:t>
             </a:fld>
             <a:endParaRPr lang="fr-FR"/>
           </a:p>
@@ -1603,7 +1609,7 @@
           <a:p>
             <a:fld id="{A3D7FE9D-6FC6-45E5-9AF4-B54471DD8207}" type="datetimeFigureOut">
               <a:rPr lang="fr-FR" smtClean="0"/>
-              <a:t>20/11/2021</a:t>
+              <a:t>20/03/2022</a:t>
             </a:fld>
             <a:endParaRPr lang="fr-FR"/>
           </a:p>
@@ -1721,7 +1727,7 @@
           <a:p>
             <a:fld id="{A3D7FE9D-6FC6-45E5-9AF4-B54471DD8207}" type="datetimeFigureOut">
               <a:rPr lang="fr-FR" smtClean="0"/>
-              <a:t>20/11/2021</a:t>
+              <a:t>20/03/2022</a:t>
             </a:fld>
             <a:endParaRPr lang="fr-FR"/>
           </a:p>
@@ -1816,7 +1822,7 @@
           <a:p>
             <a:fld id="{A3D7FE9D-6FC6-45E5-9AF4-B54471DD8207}" type="datetimeFigureOut">
               <a:rPr lang="fr-FR" smtClean="0"/>
-              <a:t>20/11/2021</a:t>
+              <a:t>20/03/2022</a:t>
             </a:fld>
             <a:endParaRPr lang="fr-FR"/>
           </a:p>
@@ -2093,7 +2099,7 @@
           <a:p>
             <a:fld id="{A3D7FE9D-6FC6-45E5-9AF4-B54471DD8207}" type="datetimeFigureOut">
               <a:rPr lang="fr-FR" smtClean="0"/>
-              <a:t>20/11/2021</a:t>
+              <a:t>20/03/2022</a:t>
             </a:fld>
             <a:endParaRPr lang="fr-FR"/>
           </a:p>
@@ -2346,7 +2352,7 @@
           <a:p>
             <a:fld id="{A3D7FE9D-6FC6-45E5-9AF4-B54471DD8207}" type="datetimeFigureOut">
               <a:rPr lang="fr-FR" smtClean="0"/>
-              <a:t>20/11/2021</a:t>
+              <a:t>20/03/2022</a:t>
             </a:fld>
             <a:endParaRPr lang="fr-FR"/>
           </a:p>
@@ -2559,7 +2565,7 @@
           <a:p>
             <a:fld id="{A3D7FE9D-6FC6-45E5-9AF4-B54471DD8207}" type="datetimeFigureOut">
               <a:rPr lang="fr-FR" smtClean="0"/>
-              <a:t>20/11/2021</a:t>
+              <a:t>20/03/2022</a:t>
             </a:fld>
             <a:endParaRPr lang="fr-FR"/>
           </a:p>
@@ -3604,6 +3610,530 @@
 </p:sld>
 </file>
 
+<file path=ppt/slides/slide2.xml><?xml version="1.0" encoding="utf-8"?>
+<p:sld xmlns:a="http://schemas.openxmlformats.org/drawingml/2006/main" xmlns:r="http://schemas.openxmlformats.org/officeDocument/2006/relationships" xmlns:p="http://schemas.openxmlformats.org/presentationml/2006/main">
+  <p:cSld>
+    <p:spTree>
+      <p:nvGrpSpPr>
+        <p:cNvPr id="1" name=""/>
+        <p:cNvGrpSpPr/>
+        <p:nvPr/>
+      </p:nvGrpSpPr>
+      <p:grpSpPr>
+        <a:xfrm>
+          <a:off x="0" y="0"/>
+          <a:ext cx="0" cy="0"/>
+          <a:chOff x="0" y="0"/>
+          <a:chExt cx="0" cy="0"/>
+        </a:xfrm>
+      </p:grpSpPr>
+      <p:sp>
+        <p:nvSpPr>
+          <p:cNvPr id="4" name="Ellipse 3"/>
+          <p:cNvSpPr/>
+          <p:nvPr/>
+        </p:nvSpPr>
+        <p:spPr>
+          <a:xfrm>
+            <a:off x="2683823" y="3266364"/>
+            <a:ext cx="1166906" cy="771896"/>
+          </a:xfrm>
+          <a:prstGeom prst="ellipse">
+            <a:avLst/>
+          </a:prstGeom>
+        </p:spPr>
+        <p:style>
+          <a:lnRef idx="2">
+            <a:schemeClr val="dk1"/>
+          </a:lnRef>
+          <a:fillRef idx="1">
+            <a:schemeClr val="lt1"/>
+          </a:fillRef>
+          <a:effectRef idx="0">
+            <a:schemeClr val="dk1"/>
+          </a:effectRef>
+          <a:fontRef idx="minor">
+            <a:schemeClr val="dk1"/>
+          </a:fontRef>
+        </p:style>
+        <p:txBody>
+          <a:bodyPr rtlCol="0" anchor="ctr"/>
+          <a:lstStyle/>
+          <a:p>
+            <a:pPr algn="ctr"/>
+            <a:r>
+              <a:rPr lang="fr-FR" sz="1400" dirty="0" err="1" smtClean="0"/>
+              <a:t>Create</a:t>
+            </a:r>
+            <a:endParaRPr lang="fr-FR" sz="1400" dirty="0"/>
+          </a:p>
+        </p:txBody>
+      </p:sp>
+      <p:sp>
+        <p:nvSpPr>
+          <p:cNvPr id="5" name="Ellipse 4"/>
+          <p:cNvSpPr/>
+          <p:nvPr/>
+        </p:nvSpPr>
+        <p:spPr>
+          <a:xfrm>
+            <a:off x="4987636" y="3156858"/>
+            <a:ext cx="1171702" cy="771896"/>
+          </a:xfrm>
+          <a:prstGeom prst="ellipse">
+            <a:avLst/>
+          </a:prstGeom>
+        </p:spPr>
+        <p:style>
+          <a:lnRef idx="2">
+            <a:schemeClr val="dk1"/>
+          </a:lnRef>
+          <a:fillRef idx="1">
+            <a:schemeClr val="lt1"/>
+          </a:fillRef>
+          <a:effectRef idx="0">
+            <a:schemeClr val="dk1"/>
+          </a:effectRef>
+          <a:fontRef idx="minor">
+            <a:schemeClr val="dk1"/>
+          </a:fontRef>
+        </p:style>
+        <p:txBody>
+          <a:bodyPr rtlCol="0" anchor="ctr"/>
+          <a:lstStyle/>
+          <a:p>
+            <a:pPr algn="ctr"/>
+            <a:r>
+              <a:rPr lang="fr-FR" sz="1400" dirty="0" smtClean="0"/>
+              <a:t>Memory</a:t>
+            </a:r>
+            <a:endParaRPr lang="fr-FR" sz="1400" dirty="0"/>
+          </a:p>
+        </p:txBody>
+      </p:sp>
+      <p:sp>
+        <p:nvSpPr>
+          <p:cNvPr id="6" name="Ellipse 5"/>
+          <p:cNvSpPr/>
+          <p:nvPr/>
+        </p:nvSpPr>
+        <p:spPr>
+          <a:xfrm>
+            <a:off x="4987636" y="1727860"/>
+            <a:ext cx="1171702" cy="771896"/>
+          </a:xfrm>
+          <a:prstGeom prst="ellipse">
+            <a:avLst/>
+          </a:prstGeom>
+        </p:spPr>
+        <p:style>
+          <a:lnRef idx="2">
+            <a:schemeClr val="dk1"/>
+          </a:lnRef>
+          <a:fillRef idx="1">
+            <a:schemeClr val="lt1"/>
+          </a:fillRef>
+          <a:effectRef idx="0">
+            <a:schemeClr val="dk1"/>
+          </a:effectRef>
+          <a:fontRef idx="minor">
+            <a:schemeClr val="dk1"/>
+          </a:fontRef>
+        </p:style>
+        <p:txBody>
+          <a:bodyPr rtlCol="0" anchor="ctr"/>
+          <a:lstStyle/>
+          <a:p>
+            <a:pPr algn="ctr"/>
+            <a:r>
+              <a:rPr lang="fr-FR" sz="1400" dirty="0" smtClean="0"/>
+              <a:t>Save</a:t>
+            </a:r>
+            <a:endParaRPr lang="fr-FR" sz="1400" dirty="0"/>
+          </a:p>
+        </p:txBody>
+      </p:sp>
+      <p:sp>
+        <p:nvSpPr>
+          <p:cNvPr id="7" name="Ellipse 6"/>
+          <p:cNvSpPr/>
+          <p:nvPr/>
+        </p:nvSpPr>
+        <p:spPr>
+          <a:xfrm>
+            <a:off x="6721434" y="2499756"/>
+            <a:ext cx="1050967" cy="771896"/>
+          </a:xfrm>
+          <a:prstGeom prst="ellipse">
+            <a:avLst/>
+          </a:prstGeom>
+        </p:spPr>
+        <p:style>
+          <a:lnRef idx="2">
+            <a:schemeClr val="dk1"/>
+          </a:lnRef>
+          <a:fillRef idx="1">
+            <a:schemeClr val="lt1"/>
+          </a:fillRef>
+          <a:effectRef idx="0">
+            <a:schemeClr val="dk1"/>
+          </a:effectRef>
+          <a:fontRef idx="minor">
+            <a:schemeClr val="dk1"/>
+          </a:fontRef>
+        </p:style>
+        <p:txBody>
+          <a:bodyPr rtlCol="0" anchor="ctr"/>
+          <a:lstStyle/>
+          <a:p>
+            <a:pPr algn="ctr"/>
+            <a:r>
+              <a:rPr lang="fr-FR" sz="1400" dirty="0" smtClean="0"/>
+              <a:t>Archive</a:t>
+            </a:r>
+            <a:endParaRPr lang="fr-FR" sz="1400" dirty="0"/>
+          </a:p>
+        </p:txBody>
+      </p:sp>
+      <p:sp>
+        <p:nvSpPr>
+          <p:cNvPr id="8" name="Ellipse 7"/>
+          <p:cNvSpPr/>
+          <p:nvPr/>
+        </p:nvSpPr>
+        <p:spPr>
+          <a:xfrm>
+            <a:off x="8518566" y="2571008"/>
+            <a:ext cx="1195450" cy="771896"/>
+          </a:xfrm>
+          <a:prstGeom prst="ellipse">
+            <a:avLst/>
+          </a:prstGeom>
+        </p:spPr>
+        <p:style>
+          <a:lnRef idx="2">
+            <a:schemeClr val="dk1"/>
+          </a:lnRef>
+          <a:fillRef idx="1">
+            <a:schemeClr val="lt1"/>
+          </a:fillRef>
+          <a:effectRef idx="0">
+            <a:schemeClr val="dk1"/>
+          </a:effectRef>
+          <a:fontRef idx="minor">
+            <a:schemeClr val="dk1"/>
+          </a:fontRef>
+        </p:style>
+        <p:txBody>
+          <a:bodyPr rtlCol="0" anchor="ctr"/>
+          <a:lstStyle/>
+          <a:p>
+            <a:pPr algn="ctr"/>
+            <a:r>
+              <a:rPr lang="fr-FR" sz="1400" dirty="0" smtClean="0"/>
+              <a:t>Destroy</a:t>
+            </a:r>
+            <a:endParaRPr lang="fr-FR" sz="1400" dirty="0"/>
+          </a:p>
+        </p:txBody>
+      </p:sp>
+      <p:cxnSp>
+        <p:nvCxnSpPr>
+          <p:cNvPr id="10" name="Connecteur droit avec flèche 9"/>
+          <p:cNvCxnSpPr/>
+          <p:nvPr/>
+        </p:nvCxnSpPr>
+        <p:spPr>
+          <a:xfrm>
+            <a:off x="3832943" y="3652312"/>
+            <a:ext cx="1154693" cy="0"/>
+          </a:xfrm>
+          <a:prstGeom prst="straightConnector1">
+            <a:avLst/>
+          </a:prstGeom>
+          <a:ln>
+            <a:tailEnd type="triangle"/>
+          </a:ln>
+        </p:spPr>
+        <p:style>
+          <a:lnRef idx="1">
+            <a:schemeClr val="accent1"/>
+          </a:lnRef>
+          <a:fillRef idx="0">
+            <a:schemeClr val="accent1"/>
+          </a:fillRef>
+          <a:effectRef idx="0">
+            <a:schemeClr val="accent1"/>
+          </a:effectRef>
+          <a:fontRef idx="minor">
+            <a:schemeClr val="tx1"/>
+          </a:fontRef>
+        </p:style>
+      </p:cxnSp>
+      <p:cxnSp>
+        <p:nvCxnSpPr>
+          <p:cNvPr id="14" name="Connecteur droit avec flèche 13"/>
+          <p:cNvCxnSpPr>
+            <a:stCxn id="5" idx="7"/>
+          </p:cNvCxnSpPr>
+          <p:nvPr/>
+        </p:nvCxnSpPr>
+        <p:spPr>
+          <a:xfrm flipH="1" flipV="1">
+            <a:off x="5975270" y="2409249"/>
+            <a:ext cx="12476" cy="860651"/>
+          </a:xfrm>
+          <a:prstGeom prst="straightConnector1">
+            <a:avLst/>
+          </a:prstGeom>
+          <a:ln>
+            <a:tailEnd type="triangle"/>
+          </a:ln>
+        </p:spPr>
+        <p:style>
+          <a:lnRef idx="1">
+            <a:schemeClr val="accent1"/>
+          </a:lnRef>
+          <a:fillRef idx="0">
+            <a:schemeClr val="accent1"/>
+          </a:fillRef>
+          <a:effectRef idx="0">
+            <a:schemeClr val="accent1"/>
+          </a:effectRef>
+          <a:fontRef idx="minor">
+            <a:schemeClr val="tx1"/>
+          </a:fontRef>
+        </p:style>
+      </p:cxnSp>
+      <p:cxnSp>
+        <p:nvCxnSpPr>
+          <p:cNvPr id="17" name="Connecteur droit avec flèche 16"/>
+          <p:cNvCxnSpPr>
+            <a:stCxn id="6" idx="3"/>
+            <a:endCxn id="5" idx="1"/>
+          </p:cNvCxnSpPr>
+          <p:nvPr/>
+        </p:nvCxnSpPr>
+        <p:spPr>
+          <a:xfrm>
+            <a:off x="5159228" y="2386714"/>
+            <a:ext cx="0" cy="883186"/>
+          </a:xfrm>
+          <a:prstGeom prst="straightConnector1">
+            <a:avLst/>
+          </a:prstGeom>
+          <a:ln>
+            <a:tailEnd type="triangle"/>
+          </a:ln>
+        </p:spPr>
+        <p:style>
+          <a:lnRef idx="1">
+            <a:schemeClr val="accent1"/>
+          </a:lnRef>
+          <a:fillRef idx="0">
+            <a:schemeClr val="accent1"/>
+          </a:fillRef>
+          <a:effectRef idx="0">
+            <a:schemeClr val="accent1"/>
+          </a:effectRef>
+          <a:fontRef idx="minor">
+            <a:schemeClr val="tx1"/>
+          </a:fontRef>
+        </p:style>
+      </p:cxnSp>
+      <p:cxnSp>
+        <p:nvCxnSpPr>
+          <p:cNvPr id="19" name="Connecteur droit avec flèche 18"/>
+          <p:cNvCxnSpPr>
+            <a:stCxn id="6" idx="6"/>
+            <a:endCxn id="7" idx="1"/>
+          </p:cNvCxnSpPr>
+          <p:nvPr/>
+        </p:nvCxnSpPr>
+        <p:spPr>
+          <a:xfrm>
+            <a:off x="6159338" y="2113808"/>
+            <a:ext cx="716007" cy="498990"/>
+          </a:xfrm>
+          <a:prstGeom prst="straightConnector1">
+            <a:avLst/>
+          </a:prstGeom>
+          <a:ln>
+            <a:tailEnd type="triangle"/>
+          </a:ln>
+        </p:spPr>
+        <p:style>
+          <a:lnRef idx="1">
+            <a:schemeClr val="accent1"/>
+          </a:lnRef>
+          <a:fillRef idx="0">
+            <a:schemeClr val="accent1"/>
+          </a:fillRef>
+          <a:effectRef idx="0">
+            <a:schemeClr val="accent1"/>
+          </a:effectRef>
+          <a:fontRef idx="minor">
+            <a:schemeClr val="tx1"/>
+          </a:fontRef>
+        </p:style>
+      </p:cxnSp>
+      <p:cxnSp>
+        <p:nvCxnSpPr>
+          <p:cNvPr id="22" name="Connecteur droit avec flèche 21"/>
+          <p:cNvCxnSpPr>
+            <a:stCxn id="6" idx="7"/>
+            <a:endCxn id="8" idx="1"/>
+          </p:cNvCxnSpPr>
+          <p:nvPr/>
+        </p:nvCxnSpPr>
+        <p:spPr>
+          <a:xfrm>
+            <a:off x="5987746" y="1840902"/>
+            <a:ext cx="2705890" cy="843148"/>
+          </a:xfrm>
+          <a:prstGeom prst="straightConnector1">
+            <a:avLst/>
+          </a:prstGeom>
+          <a:ln>
+            <a:tailEnd type="triangle"/>
+          </a:ln>
+        </p:spPr>
+        <p:style>
+          <a:lnRef idx="1">
+            <a:schemeClr val="accent1"/>
+          </a:lnRef>
+          <a:fillRef idx="0">
+            <a:schemeClr val="accent1"/>
+          </a:fillRef>
+          <a:effectRef idx="0">
+            <a:schemeClr val="accent1"/>
+          </a:effectRef>
+          <a:fontRef idx="minor">
+            <a:schemeClr val="tx1"/>
+          </a:fontRef>
+        </p:style>
+      </p:cxnSp>
+      <p:cxnSp>
+        <p:nvCxnSpPr>
+          <p:cNvPr id="25" name="Connecteur droit avec flèche 24"/>
+          <p:cNvCxnSpPr>
+            <a:stCxn id="7" idx="6"/>
+            <a:endCxn id="8" idx="2"/>
+          </p:cNvCxnSpPr>
+          <p:nvPr/>
+        </p:nvCxnSpPr>
+        <p:spPr>
+          <a:xfrm>
+            <a:off x="7772401" y="2885704"/>
+            <a:ext cx="746165" cy="71252"/>
+          </a:xfrm>
+          <a:prstGeom prst="straightConnector1">
+            <a:avLst/>
+          </a:prstGeom>
+          <a:ln>
+            <a:tailEnd type="triangle"/>
+          </a:ln>
+        </p:spPr>
+        <p:style>
+          <a:lnRef idx="1">
+            <a:schemeClr val="accent1"/>
+          </a:lnRef>
+          <a:fillRef idx="0">
+            <a:schemeClr val="accent1"/>
+          </a:fillRef>
+          <a:effectRef idx="0">
+            <a:schemeClr val="accent1"/>
+          </a:effectRef>
+          <a:fontRef idx="minor">
+            <a:schemeClr val="tx1"/>
+          </a:fontRef>
+        </p:style>
+      </p:cxnSp>
+      <p:cxnSp>
+        <p:nvCxnSpPr>
+          <p:cNvPr id="27" name="Connecteur droit avec flèche 26"/>
+          <p:cNvCxnSpPr>
+            <a:stCxn id="7" idx="3"/>
+            <a:endCxn id="5" idx="6"/>
+          </p:cNvCxnSpPr>
+          <p:nvPr/>
+        </p:nvCxnSpPr>
+        <p:spPr>
+          <a:xfrm flipH="1">
+            <a:off x="6159338" y="3158610"/>
+            <a:ext cx="716007" cy="384196"/>
+          </a:xfrm>
+          <a:prstGeom prst="straightConnector1">
+            <a:avLst/>
+          </a:prstGeom>
+          <a:ln>
+            <a:tailEnd type="triangle"/>
+          </a:ln>
+        </p:spPr>
+        <p:style>
+          <a:lnRef idx="1">
+            <a:schemeClr val="accent1"/>
+          </a:lnRef>
+          <a:fillRef idx="0">
+            <a:schemeClr val="accent1"/>
+          </a:fillRef>
+          <a:effectRef idx="0">
+            <a:schemeClr val="accent1"/>
+          </a:effectRef>
+          <a:fontRef idx="minor">
+            <a:schemeClr val="tx1"/>
+          </a:fontRef>
+        </p:style>
+      </p:cxnSp>
+      <p:cxnSp>
+        <p:nvCxnSpPr>
+          <p:cNvPr id="29" name="Connecteur droit avec flèche 28"/>
+          <p:cNvCxnSpPr>
+            <a:stCxn id="5" idx="5"/>
+            <a:endCxn id="8" idx="3"/>
+          </p:cNvCxnSpPr>
+          <p:nvPr/>
+        </p:nvCxnSpPr>
+        <p:spPr>
+          <a:xfrm flipV="1">
+            <a:off x="5987746" y="3229862"/>
+            <a:ext cx="2705890" cy="585850"/>
+          </a:xfrm>
+          <a:prstGeom prst="straightConnector1">
+            <a:avLst/>
+          </a:prstGeom>
+          <a:ln>
+            <a:tailEnd type="triangle"/>
+          </a:ln>
+        </p:spPr>
+        <p:style>
+          <a:lnRef idx="1">
+            <a:schemeClr val="accent1"/>
+          </a:lnRef>
+          <a:fillRef idx="0">
+            <a:schemeClr val="accent1"/>
+          </a:fillRef>
+          <a:effectRef idx="0">
+            <a:schemeClr val="accent1"/>
+          </a:effectRef>
+          <a:fontRef idx="minor">
+            <a:schemeClr val="tx1"/>
+          </a:fontRef>
+        </p:style>
+      </p:cxnSp>
+    </p:spTree>
+    <p:extLst>
+      <p:ext uri="{BB962C8B-B14F-4D97-AF65-F5344CB8AC3E}">
+        <p14:creationId xmlns:p14="http://schemas.microsoft.com/office/powerpoint/2010/main" val="1035854933"/>
+      </p:ext>
+    </p:extLst>
+  </p:cSld>
+  <p:clrMapOvr>
+    <a:masterClrMapping/>
+  </p:clrMapOvr>
+</p:sld>
+</file>
+
 <file path=ppt/theme/theme1.xml><?xml version="1.0" encoding="utf-8"?>
 <a:theme xmlns:a="http://schemas.openxmlformats.org/drawingml/2006/main" name="Thème Office">
   <a:themeElements>

</xml_diff>